<commit_message>
Added slide notes, lab goals
</commit_message>
<xml_diff>
--- a/300.pptx
+++ b/300.pptx
@@ -5,7 +5,7 @@
     <p:sldMasterId id="2147483816" r:id="rId1"/>
   </p:sldMasterIdLst>
   <p:notesMasterIdLst>
-    <p:notesMasterId r:id="rId17"/>
+    <p:notesMasterId r:id="rId18"/>
   </p:notesMasterIdLst>
   <p:sldIdLst>
     <p:sldId id="256" r:id="rId2"/>
@@ -22,7 +22,8 @@
     <p:sldId id="387" r:id="rId13"/>
     <p:sldId id="388" r:id="rId14"/>
     <p:sldId id="380" r:id="rId15"/>
-    <p:sldId id="328" r:id="rId16"/>
+    <p:sldId id="389" r:id="rId16"/>
+    <p:sldId id="328" r:id="rId17"/>
   </p:sldIdLst>
   <p:sldSz cx="9144000" cy="6858000" type="screen4x3"/>
   <p:notesSz cx="6858000" cy="9144000"/>
@@ -1503,6 +1504,200 @@
       </p:grpSpPr>
       <p:sp>
         <p:nvSpPr>
+          <p:cNvPr id="2" name="Slide Image Placeholder 1"/>
+          <p:cNvSpPr>
+            <a:spLocks noGrp="1" noRot="1" noChangeAspect="1"/>
+          </p:cNvSpPr>
+          <p:nvPr>
+            <p:ph type="sldImg"/>
+          </p:nvPr>
+        </p:nvSpPr>
+        <p:spPr/>
+      </p:sp>
+      <p:sp>
+        <p:nvSpPr>
+          <p:cNvPr id="3" name="Notes Placeholder 2"/>
+          <p:cNvSpPr>
+            <a:spLocks noGrp="1"/>
+          </p:cNvSpPr>
+          <p:nvPr>
+            <p:ph type="body" idx="1"/>
+          </p:nvPr>
+        </p:nvSpPr>
+        <p:spPr/>
+        <p:txBody>
+          <a:bodyPr/>
+          <a:lstStyle/>
+          <a:p>
+            <a:pPr marL="119063" eaLnBrk="1" hangingPunct="1">
+              <a:spcBef>
+                <a:spcPts val="450"/>
+              </a:spcBef>
+            </a:pPr>
+            <a:r>
+              <a:rPr lang="en-US" dirty="0" smtClean="0">
+                <a:solidFill>
+                  <a:srgbClr val="000000"/>
+                </a:solidFill>
+                <a:latin typeface="Times New Roman" charset="0"/>
+                <a:ea typeface="ＭＳ Ｐゴシック" charset="0"/>
+                <a:cs typeface="Times New Roman" charset="0"/>
+                <a:sym typeface="Times New Roman" charset="0"/>
+              </a:rPr>
+              <a:t>In this lab, we will be refactoring </a:t>
+            </a:r>
+            <a:r>
+              <a:rPr lang="en-US" dirty="0" err="1" smtClean="0">
+                <a:solidFill>
+                  <a:srgbClr val="000000"/>
+                </a:solidFill>
+                <a:latin typeface="Times New Roman" charset="0"/>
+                <a:ea typeface="ＭＳ Ｐゴシック" charset="0"/>
+                <a:cs typeface="Times New Roman" charset="0"/>
+                <a:sym typeface="Times New Roman" charset="0"/>
+              </a:rPr>
+              <a:t>TiBountyHunter</a:t>
+            </a:r>
+            <a:r>
+              <a:rPr lang="en-US" dirty="0" smtClean="0">
+                <a:solidFill>
+                  <a:srgbClr val="000000"/>
+                </a:solidFill>
+                <a:latin typeface="Times New Roman" charset="0"/>
+                <a:ea typeface="ＭＳ Ｐゴシック" charset="0"/>
+                <a:cs typeface="Times New Roman" charset="0"/>
+                <a:sym typeface="Times New Roman" charset="0"/>
+              </a:rPr>
+              <a:t> to be a little smarter about performance.  We will utilize multiple contexts,</a:t>
+            </a:r>
+            <a:r>
+              <a:rPr lang="en-US" baseline="0" dirty="0" smtClean="0">
+                <a:solidFill>
+                  <a:srgbClr val="000000"/>
+                </a:solidFill>
+                <a:latin typeface="Times New Roman" charset="0"/>
+                <a:ea typeface="ＭＳ Ｐゴシック" charset="0"/>
+                <a:cs typeface="Times New Roman" charset="0"/>
+                <a:sym typeface="Times New Roman" charset="0"/>
+              </a:rPr>
+              <a:t> modular code organization, and deferred script loading.</a:t>
+            </a:r>
+          </a:p>
+          <a:p>
+            <a:pPr marL="119063" eaLnBrk="1" hangingPunct="1">
+              <a:spcBef>
+                <a:spcPts val="450"/>
+              </a:spcBef>
+            </a:pPr>
+            <a:endParaRPr lang="en-US" baseline="0" dirty="0" smtClean="0">
+              <a:solidFill>
+                <a:srgbClr val="000000"/>
+              </a:solidFill>
+              <a:latin typeface="Times New Roman" charset="0"/>
+              <a:ea typeface="ＭＳ Ｐゴシック" charset="0"/>
+              <a:cs typeface="Times New Roman" charset="0"/>
+              <a:sym typeface="Times New Roman" charset="0"/>
+            </a:endParaRPr>
+          </a:p>
+          <a:p>
+            <a:pPr marL="119063" eaLnBrk="1" hangingPunct="1">
+              <a:spcBef>
+                <a:spcPts val="450"/>
+              </a:spcBef>
+            </a:pPr>
+            <a:r>
+              <a:rPr lang="en-US" baseline="0" dirty="0" smtClean="0">
+                <a:solidFill>
+                  <a:srgbClr val="000000"/>
+                </a:solidFill>
+                <a:latin typeface="Times New Roman" charset="0"/>
+                <a:ea typeface="ＭＳ Ｐゴシック" charset="0"/>
+                <a:cs typeface="Times New Roman" charset="0"/>
+                <a:sym typeface="Times New Roman" charset="0"/>
+              </a:rPr>
+              <a:t>We’ll download the source, build &amp; run it, then we’ll see how to defer loading during a code walk-thru</a:t>
+            </a:r>
+            <a:endParaRPr lang="en-US" baseline="0" dirty="0" smtClean="0">
+              <a:solidFill>
+                <a:srgbClr val="000000"/>
+              </a:solidFill>
+              <a:latin typeface="Times New Roman" charset="0"/>
+              <a:ea typeface="ＭＳ Ｐゴシック" charset="0"/>
+              <a:cs typeface="Times New Roman" charset="0"/>
+              <a:sym typeface="Times New Roman" charset="0"/>
+            </a:endParaRPr>
+          </a:p>
+        </p:txBody>
+      </p:sp>
+      <p:sp>
+        <p:nvSpPr>
+          <p:cNvPr id="4" name="Slide Number Placeholder 3"/>
+          <p:cNvSpPr>
+            <a:spLocks noGrp="1"/>
+          </p:cNvSpPr>
+          <p:nvPr>
+            <p:ph type="sldNum" sz="quarter" idx="10"/>
+          </p:nvPr>
+        </p:nvSpPr>
+        <p:spPr>
+          <a:xfrm>
+            <a:off x="3884613" y="8685213"/>
+            <a:ext cx="2971800" cy="457200"/>
+          </a:xfrm>
+          <a:prstGeom prst="rect">
+            <a:avLst/>
+          </a:prstGeom>
+        </p:spPr>
+        <p:txBody>
+          <a:bodyPr/>
+          <a:lstStyle/>
+          <a:p>
+            <a:pPr>
+              <a:defRPr/>
+            </a:pPr>
+            <a:fld id="{C704D923-8FB6-2040-A5D7-BD75ED8E8368}" type="slidenum">
+              <a:rPr lang="en-US" smtClean="0"/>
+              <a:pPr>
+                <a:defRPr/>
+              </a:pPr>
+              <a:t>15</a:t>
+            </a:fld>
+            <a:endParaRPr lang="en-US"/>
+          </a:p>
+        </p:txBody>
+      </p:sp>
+    </p:spTree>
+    <p:extLst>
+      <p:ext uri="{BB962C8B-B14F-4D97-AF65-F5344CB8AC3E}">
+        <p14:creationId xmlns:p14="http://schemas.microsoft.com/office/powerpoint/2010/main" val="2440708566"/>
+      </p:ext>
+    </p:extLst>
+  </p:cSld>
+  <p:clrMapOvr>
+    <a:masterClrMapping/>
+  </p:clrMapOvr>
+</p:notes>
+</file>
+
+<file path=ppt/notesSlides/notesSlide16.xml><?xml version="1.0" encoding="utf-8"?>
+<p:notes xmlns:a="http://schemas.openxmlformats.org/drawingml/2006/main" xmlns:r="http://schemas.openxmlformats.org/officeDocument/2006/relationships" xmlns:p="http://schemas.openxmlformats.org/presentationml/2006/main">
+  <p:cSld>
+    <p:spTree>
+      <p:nvGrpSpPr>
+        <p:cNvPr id="1" name=""/>
+        <p:cNvGrpSpPr/>
+        <p:nvPr/>
+      </p:nvGrpSpPr>
+      <p:grpSpPr>
+        <a:xfrm>
+          <a:off x="0" y="0"/>
+          <a:ext cx="0" cy="0"/>
+          <a:chOff x="0" y="0"/>
+          <a:chExt cx="0" cy="0"/>
+        </a:xfrm>
+      </p:grpSpPr>
+      <p:sp>
+        <p:nvSpPr>
           <p:cNvPr id="17409" name="Rectangle 1"/>
           <p:cNvSpPr>
             <a:spLocks noGrp="1" noRot="1" noChangeAspect="1" noChangeArrowheads="1"/>
@@ -1561,7 +1756,7 @@
               </a:spcBef>
             </a:pPr>
             <a:r>
-              <a:rPr lang="en-US" dirty="0" smtClean="0">
+              <a:rPr lang="en-US" b="1" baseline="0" dirty="0" smtClean="0">
                 <a:solidFill>
                   <a:srgbClr val="000000"/>
                 </a:solidFill>
@@ -1570,90 +1765,7 @@
                 <a:cs typeface="Times New Roman" charset="0"/>
                 <a:sym typeface="Times New Roman" charset="0"/>
               </a:rPr>
-              <a:t>In this lab, we will be refactoring </a:t>
-            </a:r>
-            <a:r>
-              <a:rPr lang="en-US" dirty="0" err="1" smtClean="0">
-                <a:solidFill>
-                  <a:srgbClr val="000000"/>
-                </a:solidFill>
-                <a:latin typeface="Times New Roman" charset="0"/>
-                <a:ea typeface="ＭＳ Ｐゴシック" charset="0"/>
-                <a:cs typeface="Times New Roman" charset="0"/>
-                <a:sym typeface="Times New Roman" charset="0"/>
-              </a:rPr>
-              <a:t>TiBountyHunter</a:t>
-            </a:r>
-            <a:r>
-              <a:rPr lang="en-US" dirty="0" smtClean="0">
-                <a:solidFill>
-                  <a:srgbClr val="000000"/>
-                </a:solidFill>
-                <a:latin typeface="Times New Roman" charset="0"/>
-                <a:ea typeface="ＭＳ Ｐゴシック" charset="0"/>
-                <a:cs typeface="Times New Roman" charset="0"/>
-                <a:sym typeface="Times New Roman" charset="0"/>
-              </a:rPr>
-              <a:t> to be a little smarter about performance.  We will utilize multiple contexts,</a:t>
-            </a:r>
-            <a:r>
-              <a:rPr lang="en-US" baseline="0" dirty="0" smtClean="0">
-                <a:solidFill>
-                  <a:srgbClr val="000000"/>
-                </a:solidFill>
-                <a:latin typeface="Times New Roman" charset="0"/>
-                <a:ea typeface="ＭＳ Ｐゴシック" charset="0"/>
-                <a:cs typeface="Times New Roman" charset="0"/>
-                <a:sym typeface="Times New Roman" charset="0"/>
-              </a:rPr>
-              <a:t> modular code organization, and deferred script loading</a:t>
-            </a:r>
-            <a:r>
-              <a:rPr lang="en-US" baseline="0" dirty="0" smtClean="0">
-                <a:solidFill>
-                  <a:srgbClr val="000000"/>
-                </a:solidFill>
-                <a:latin typeface="Times New Roman" charset="0"/>
-                <a:ea typeface="ＭＳ Ｐゴシック" charset="0"/>
-                <a:cs typeface="Times New Roman" charset="0"/>
-                <a:sym typeface="Times New Roman" charset="0"/>
-              </a:rPr>
-              <a:t>.</a:t>
-            </a:r>
-          </a:p>
-          <a:p>
-            <a:pPr marL="119063" eaLnBrk="1" hangingPunct="1">
-              <a:spcBef>
-                <a:spcPts val="450"/>
-              </a:spcBef>
-            </a:pPr>
-            <a:endParaRPr lang="en-US" baseline="0" dirty="0" smtClean="0">
-              <a:solidFill>
-                <a:srgbClr val="000000"/>
-              </a:solidFill>
-              <a:latin typeface="Times New Roman" charset="0"/>
-              <a:ea typeface="ＭＳ Ｐゴシック" charset="0"/>
-              <a:cs typeface="Times New Roman" charset="0"/>
-              <a:sym typeface="Times New Roman" charset="0"/>
-            </a:endParaRPr>
-          </a:p>
-          <a:p>
-            <a:pPr marL="119063" eaLnBrk="1" hangingPunct="1">
-              <a:spcBef>
-                <a:spcPts val="450"/>
-              </a:spcBef>
-            </a:pPr>
-            <a:r>
-              <a:rPr lang="en-US" baseline="0" dirty="0" smtClean="0">
-                <a:solidFill>
-                  <a:srgbClr val="000000"/>
-                </a:solidFill>
-                <a:latin typeface="Times New Roman" charset="0"/>
-                <a:ea typeface="ＭＳ Ｐゴシック" charset="0"/>
-                <a:cs typeface="Times New Roman" charset="0"/>
-                <a:sym typeface="Times New Roman" charset="0"/>
-              </a:rPr>
-              <a:t>We’ll download the source, build &amp; run it, then we’ll see how to defer loading during a code walk-thru</a:t>
+              <a:t>Code walk-through</a:t>
             </a:r>
           </a:p>
           <a:p>
@@ -2309,29 +2421,8 @@
                 <a:cs typeface="Times New Roman" charset="0"/>
                 <a:sym typeface="Times New Roman" charset="0"/>
               </a:rPr>
-              <a:t>Especially if the count is going to point to some proxy object that would call over the bridge to native land (child rows of </a:t>
-            </a:r>
-            <a:r>
-              <a:rPr lang="en-US" baseline="0" smtClean="0">
-                <a:solidFill>
-                  <a:srgbClr val="000000"/>
-                </a:solidFill>
-                <a:latin typeface="Times New Roman" charset="0"/>
-                <a:ea typeface="ＭＳ Ｐゴシック" charset="0"/>
-                <a:cs typeface="Times New Roman" charset="0"/>
-                <a:sym typeface="Times New Roman" charset="0"/>
-              </a:rPr>
-              <a:t>a table)</a:t>
-            </a:r>
-            <a:endParaRPr lang="en-US" baseline="0" dirty="0" smtClean="0">
-              <a:solidFill>
-                <a:srgbClr val="000000"/>
-              </a:solidFill>
-              <a:latin typeface="Times New Roman" charset="0"/>
-              <a:ea typeface="ＭＳ Ｐゴシック" charset="0"/>
-              <a:cs typeface="Times New Roman" charset="0"/>
-              <a:sym typeface="Times New Roman" charset="0"/>
-            </a:endParaRPr>
+              <a:t>Especially if the count is going to point to some proxy object that would call over the bridge to native land (child rows of a table)</a:t>
+            </a:r>
           </a:p>
         </p:txBody>
       </p:sp>
@@ -3434,10 +3525,10 @@
                 <a:cs typeface="Lucida Grande" charset="0"/>
                 <a:sym typeface="Lucida Grande" charset="0"/>
               </a:rPr>
-              <a:t>For </a:t>
-            </a:r>
-            <a:r>
-              <a:rPr lang="en-US" b="0" dirty="0" smtClean="0">
+              <a:t>For the second and third</a:t>
+            </a:r>
+            <a:r>
+              <a:rPr lang="en-US" b="0" baseline="0" dirty="0" smtClean="0">
                 <a:solidFill>
                   <a:srgbClr val="000000"/>
                 </a:solidFill>
@@ -3446,43 +3537,7 @@
                 <a:cs typeface="Lucida Grande" charset="0"/>
                 <a:sym typeface="Lucida Grande" charset="0"/>
               </a:rPr>
-              <a:t>the second and third</a:t>
-            </a:r>
-            <a:r>
-              <a:rPr lang="en-US" b="0" baseline="0" dirty="0" smtClean="0">
-                <a:solidFill>
-                  <a:srgbClr val="000000"/>
-                </a:solidFill>
-                <a:latin typeface="Lucida Grande" charset="0"/>
-                <a:ea typeface="ＭＳ Ｐゴシック" charset="0"/>
-                <a:cs typeface="Lucida Grande" charset="0"/>
-                <a:sym typeface="Lucida Grande" charset="0"/>
-              </a:rPr>
-              <a:t> point – it is tempting to package JSON files in your resources directory and JSON-parse them as </a:t>
-            </a:r>
-            <a:r>
-              <a:rPr lang="en-US" b="0" baseline="0" dirty="0" smtClean="0">
-                <a:solidFill>
-                  <a:srgbClr val="000000"/>
-                </a:solidFill>
-                <a:latin typeface="Lucida Grande" charset="0"/>
-                <a:ea typeface="ＭＳ Ｐゴシック" charset="0"/>
-                <a:cs typeface="Lucida Grande" charset="0"/>
-                <a:sym typeface="Lucida Grande" charset="0"/>
-              </a:rPr>
-              <a:t>configuration, </a:t>
-            </a:r>
-            <a:r>
-              <a:rPr lang="en-US" b="0" baseline="0" dirty="0" smtClean="0">
-                <a:solidFill>
-                  <a:srgbClr val="000000"/>
-                </a:solidFill>
-                <a:latin typeface="Lucida Grande" charset="0"/>
-                <a:ea typeface="ＭＳ Ｐゴシック" charset="0"/>
-                <a:cs typeface="Lucida Grande" charset="0"/>
-                <a:sym typeface="Lucida Grande" charset="0"/>
-              </a:rPr>
-              <a:t>resource bundles, etc.  This is fine for small numbers of files, but can be costly as files get large</a:t>
+              <a:t> point – it is tempting to package JSON files in your resources directory and JSON-parse them as configuration, resource bundles, etc.  This is fine for small numbers of files, but can be costly as files get large</a:t>
             </a:r>
           </a:p>
           <a:p>
@@ -3515,31 +3570,7 @@
                 <a:cs typeface="Lucida Grande" charset="0"/>
                 <a:sym typeface="Lucida Grande" charset="0"/>
               </a:rPr>
-              <a:t>Older </a:t>
-            </a:r>
-            <a:r>
-              <a:rPr lang="en-US" b="0" baseline="0" dirty="0" smtClean="0">
-                <a:solidFill>
-                  <a:srgbClr val="000000"/>
-                </a:solidFill>
-                <a:latin typeface="Lucida Grande" charset="0"/>
-                <a:ea typeface="ＭＳ Ｐゴシック" charset="0"/>
-                <a:cs typeface="Lucida Grande" charset="0"/>
-                <a:sym typeface="Lucida Grande" charset="0"/>
-              </a:rPr>
-              <a:t>“hack</a:t>
-            </a:r>
-            <a:r>
-              <a:rPr lang="en-US" b="0" baseline="0" dirty="0" smtClean="0">
-                <a:solidFill>
-                  <a:srgbClr val="000000"/>
-                </a:solidFill>
-                <a:latin typeface="Lucida Grande" charset="0"/>
-                <a:ea typeface="ＭＳ Ｐゴシック" charset="0"/>
-                <a:cs typeface="Lucida Grande" charset="0"/>
-                <a:sym typeface="Lucida Grande" charset="0"/>
-              </a:rPr>
-              <a:t>” of adding objects, functions, and values to </a:t>
+              <a:t>Older “hack” of adding objects, functions, and values to </a:t>
             </a:r>
             <a:r>
               <a:rPr lang="en-US" b="0" baseline="0" dirty="0" err="1" smtClean="0">
@@ -8136,23 +8167,7 @@
                 <a:ea typeface="ヒラギノ角ゴ ProN W3" charset="0"/>
                 <a:cs typeface="ヒラギノ角ゴ ProN W3" charset="0"/>
               </a:rPr>
-              <a:t>In very large apps for which deferring script </a:t>
-            </a:r>
-            <a:r>
-              <a:rPr lang="en-US" dirty="0" smtClean="0">
-                <a:latin typeface="Trebuchet MS" charset="0"/>
-                <a:ea typeface="ヒラギノ角ゴ ProN W3" charset="0"/>
-                <a:cs typeface="ヒラギノ角ゴ ProN W3" charset="0"/>
-              </a:rPr>
-              <a:t>evaluation </a:t>
-            </a:r>
-            <a:r>
-              <a:rPr lang="en-US" dirty="0" smtClean="0">
-                <a:latin typeface="Trebuchet MS" charset="0"/>
-                <a:ea typeface="ヒラギノ角ゴ ProN W3" charset="0"/>
-                <a:cs typeface="ヒラギノ角ゴ ProN W3" charset="0"/>
-              </a:rPr>
-              <a:t>is critical, multiple contexts are a good choice</a:t>
+              <a:t>In very large apps for which deferring script evaluation is critical, multiple contexts are a good choice</a:t>
             </a:r>
           </a:p>
           <a:p>
@@ -8190,21 +8205,8 @@
                 <a:ea typeface="ヒラギノ角ゴ ProN W3" charset="0"/>
                 <a:cs typeface="ヒラギノ角ゴ ProN W3" charset="0"/>
               </a:rPr>
-              <a:t>Downside – dependencies may be evaluated multiple </a:t>
-            </a:r>
-            <a:r>
-              <a:rPr lang="en-US" dirty="0" smtClean="0">
-                <a:latin typeface="Trebuchet MS" charset="0"/>
-                <a:ea typeface="ヒラギノ角ゴ ProN W3" charset="0"/>
-                <a:cs typeface="ヒラギノ角ゴ ProN W3" charset="0"/>
-              </a:rPr>
-              <a:t>times</a:t>
-            </a:r>
-            <a:endParaRPr lang="en-US" dirty="0" smtClean="0">
-              <a:latin typeface="Trebuchet MS" charset="0"/>
-              <a:ea typeface="ヒラギノ角ゴ ProN W3" charset="0"/>
-              <a:cs typeface="ヒラギノ角ゴ ProN W3" charset="0"/>
-            </a:endParaRPr>
+              <a:t>Downside – dependencies may be evaluated multiple times</a:t>
+            </a:r>
           </a:p>
           <a:p>
             <a:pPr eaLnBrk="1" hangingPunct="1"/>
@@ -8222,21 +8224,8 @@
                 <a:ea typeface="ヒラギノ角ゴ ProN W3" charset="0"/>
                 <a:cs typeface="ヒラギノ角ゴ ProN W3" charset="0"/>
               </a:rPr>
-              <a:t>Titanium 2 – Single context will likely be </a:t>
-            </a:r>
-            <a:r>
-              <a:rPr lang="en-US" dirty="0" smtClean="0">
-                <a:latin typeface="Trebuchet MS" charset="0"/>
-                <a:ea typeface="ヒラギノ角ゴ ProN W3" charset="0"/>
-                <a:cs typeface="ヒラギノ角ゴ ProN W3" charset="0"/>
-              </a:rPr>
-              <a:t>default</a:t>
-            </a:r>
-            <a:endParaRPr lang="en-US" dirty="0" smtClean="0">
-              <a:latin typeface="Trebuchet MS" charset="0"/>
-              <a:ea typeface="ヒラギノ角ゴ ProN W3" charset="0"/>
-              <a:cs typeface="ヒラギノ角ゴ ProN W3" charset="0"/>
-            </a:endParaRPr>
+              <a:t>Titanium 2 – Single context will likely be default</a:t>
+            </a:r>
           </a:p>
           <a:p>
             <a:pPr eaLnBrk="1" hangingPunct="1"/>
@@ -8547,15 +8536,7 @@
                 <a:ea typeface="ヒラギノ角ゴ ProN W3" charset="0"/>
                 <a:cs typeface="ヒラギノ角ゴ ProN W3" charset="0"/>
               </a:rPr>
-              <a:t>Set </a:t>
-            </a:r>
-            <a:r>
-              <a:rPr lang="en-US" dirty="0" smtClean="0">
-                <a:latin typeface="Trebuchet MS" charset="0"/>
-                <a:ea typeface="ヒラギノ角ゴ ProN W3" charset="0"/>
-                <a:cs typeface="ヒラギノ角ゴ ProN W3" charset="0"/>
-              </a:rPr>
-              <a:t>all rows at the same time, don’t call append 300 times</a:t>
+              <a:t>Set all rows at the same time, don’t call append 300 times</a:t>
             </a:r>
           </a:p>
           <a:p>
@@ -8574,15 +8555,7 @@
                 <a:ea typeface="ヒラギノ角ゴ ProN W3" charset="0"/>
                 <a:cs typeface="ヒラギノ角ゴ ProN W3" charset="0"/>
               </a:rPr>
-              <a:t>Only </a:t>
-            </a:r>
-            <a:r>
-              <a:rPr lang="en-US" dirty="0" smtClean="0">
-                <a:latin typeface="Trebuchet MS" charset="0"/>
-                <a:ea typeface="ヒラギノ角ゴ ProN W3" charset="0"/>
-                <a:cs typeface="ヒラギノ角ゴ ProN W3" charset="0"/>
-              </a:rPr>
-              <a:t>load as much data as needed</a:t>
+              <a:t>Only load as much data as needed</a:t>
             </a:r>
           </a:p>
           <a:p>
@@ -9522,6 +9495,181 @@
 </file>
 
 <file path=ppt/slides/slide15.xml><?xml version="1.0" encoding="utf-8"?>
+<p:sld xmlns:a="http://schemas.openxmlformats.org/drawingml/2006/main" xmlns:r="http://schemas.openxmlformats.org/officeDocument/2006/relationships" xmlns:p="http://schemas.openxmlformats.org/presentationml/2006/main">
+  <p:cSld>
+    <p:spTree>
+      <p:nvGrpSpPr>
+        <p:cNvPr id="1" name=""/>
+        <p:cNvGrpSpPr/>
+        <p:nvPr/>
+      </p:nvGrpSpPr>
+      <p:grpSpPr>
+        <a:xfrm>
+          <a:off x="0" y="0"/>
+          <a:ext cx="0" cy="0"/>
+          <a:chOff x="0" y="0"/>
+          <a:chExt cx="0" cy="0"/>
+        </a:xfrm>
+      </p:grpSpPr>
+      <p:sp>
+        <p:nvSpPr>
+          <p:cNvPr id="2" name="Title 1"/>
+          <p:cNvSpPr>
+            <a:spLocks noGrp="1"/>
+          </p:cNvSpPr>
+          <p:nvPr>
+            <p:ph type="title"/>
+          </p:nvPr>
+        </p:nvSpPr>
+        <p:spPr/>
+        <p:txBody>
+          <a:bodyPr/>
+          <a:lstStyle/>
+          <a:p>
+            <a:r>
+              <a:rPr lang="en-US" dirty="0" smtClean="0"/>
+              <a:t>Lab Goals</a:t>
+            </a:r>
+            <a:endParaRPr lang="en-US" dirty="0"/>
+          </a:p>
+        </p:txBody>
+      </p:sp>
+      <p:sp>
+        <p:nvSpPr>
+          <p:cNvPr id="3" name="Content Placeholder 2"/>
+          <p:cNvSpPr>
+            <a:spLocks noGrp="1"/>
+          </p:cNvSpPr>
+          <p:nvPr>
+            <p:ph idx="1"/>
+          </p:nvPr>
+        </p:nvSpPr>
+        <p:spPr/>
+        <p:txBody>
+          <a:bodyPr/>
+          <a:lstStyle/>
+          <a:p>
+            <a:pPr>
+              <a:spcBef>
+                <a:spcPts val="600"/>
+              </a:spcBef>
+              <a:buClrTx/>
+              <a:buFontTx/>
+              <a:buNone/>
+            </a:pPr>
+            <a:r>
+              <a:rPr lang="en-US" dirty="0" smtClean="0"/>
+              <a:t>Refactor </a:t>
+            </a:r>
+            <a:r>
+              <a:rPr lang="en-US" dirty="0" err="1" smtClean="0"/>
+              <a:t>TiBountyHunter</a:t>
+            </a:r>
+            <a:r>
+              <a:rPr lang="en-US" dirty="0" smtClean="0"/>
+              <a:t> to optimize performance</a:t>
+            </a:r>
+          </a:p>
+          <a:p>
+            <a:pPr>
+              <a:spcBef>
+                <a:spcPts val="600"/>
+              </a:spcBef>
+              <a:buClrTx/>
+              <a:buFontTx/>
+              <a:buNone/>
+            </a:pPr>
+            <a:endParaRPr lang="en-US" dirty="0"/>
+          </a:p>
+          <a:p>
+            <a:pPr>
+              <a:spcBef>
+                <a:spcPts val="600"/>
+              </a:spcBef>
+              <a:buClrTx/>
+              <a:buFontTx/>
+              <a:buNone/>
+            </a:pPr>
+            <a:r>
+              <a:rPr lang="en-US" dirty="0" smtClean="0"/>
+              <a:t>Improve code modularization</a:t>
+            </a:r>
+          </a:p>
+          <a:p>
+            <a:pPr>
+              <a:spcBef>
+                <a:spcPts val="600"/>
+              </a:spcBef>
+              <a:buClrTx/>
+              <a:buFontTx/>
+              <a:buNone/>
+            </a:pPr>
+            <a:endParaRPr lang="en-US" dirty="0"/>
+          </a:p>
+          <a:p>
+            <a:pPr>
+              <a:spcBef>
+                <a:spcPts val="600"/>
+              </a:spcBef>
+              <a:buClrTx/>
+              <a:buFontTx/>
+              <a:buNone/>
+            </a:pPr>
+            <a:r>
+              <a:rPr lang="en-US" dirty="0" smtClean="0"/>
+              <a:t>Defer script loading</a:t>
+            </a:r>
+            <a:endParaRPr lang="en-US" dirty="0" smtClean="0"/>
+          </a:p>
+          <a:p>
+            <a:pPr>
+              <a:spcBef>
+                <a:spcPts val="600"/>
+              </a:spcBef>
+              <a:buClrTx/>
+              <a:buFontTx/>
+              <a:buNone/>
+            </a:pPr>
+            <a:endParaRPr lang="en-US" dirty="0"/>
+          </a:p>
+          <a:p>
+            <a:pPr>
+              <a:spcBef>
+                <a:spcPts val="600"/>
+              </a:spcBef>
+              <a:buClrTx/>
+              <a:buFontTx/>
+              <a:buNone/>
+            </a:pPr>
+            <a:r>
+              <a:rPr lang="en-US" dirty="0" smtClean="0"/>
+              <a:t>Wiki URL</a:t>
+            </a:r>
+            <a:endParaRPr lang="en-US" dirty="0"/>
+          </a:p>
+        </p:txBody>
+      </p:sp>
+    </p:spTree>
+    <p:extLst>
+      <p:ext uri="{BB962C8B-B14F-4D97-AF65-F5344CB8AC3E}">
+        <p14:creationId xmlns:p14="http://schemas.microsoft.com/office/powerpoint/2010/main" val="633553504"/>
+      </p:ext>
+    </p:extLst>
+  </p:cSld>
+  <p:clrMapOvr>
+    <a:masterClrMapping/>
+  </p:clrMapOvr>
+  <p:timing>
+    <p:tnLst>
+      <p:par>
+        <p:cTn xmlns:p14="http://schemas.microsoft.com/office/powerpoint/2010/main" id="1" dur="indefinite" restart="never" nodeType="tmRoot"/>
+      </p:par>
+    </p:tnLst>
+  </p:timing>
+</p:sld>
+</file>
+
+<file path=ppt/slides/slide16.xml><?xml version="1.0" encoding="utf-8"?>
 <p:sld xmlns:a="http://schemas.openxmlformats.org/drawingml/2006/main" xmlns:r="http://schemas.openxmlformats.org/officeDocument/2006/relationships" xmlns:p="http://schemas.openxmlformats.org/presentationml/2006/main">
   <p:cSld>
     <p:spTree>

</xml_diff>

<commit_message>
Fixes and changes from Ti changes
</commit_message>
<xml_diff>
--- a/300.pptx
+++ b/300.pptx
@@ -1224,19 +1224,7 @@
                 <a:cs typeface="Lucida Grande" charset="0"/>
                 <a:sym typeface="Lucida Grande" charset="0"/>
               </a:rPr>
-              <a:t>Perhaps you can use alternate UI paradigm to create smaller </a:t>
-            </a:r>
-            <a:r>
-              <a:rPr lang="en-US" b="0" baseline="0" dirty="0" smtClean="0">
-                <a:solidFill>
-                  <a:srgbClr val="000000"/>
-                </a:solidFill>
-                <a:latin typeface="Lucida Grande" charset="0"/>
-                <a:ea typeface="ＭＳ Ｐゴシック" charset="0"/>
-                <a:cs typeface="Lucida Grande" charset="0"/>
-                <a:sym typeface="Lucida Grande" charset="0"/>
-              </a:rPr>
-              <a:t>tables</a:t>
+              <a:t>Perhaps you can use alternate UI paradigm to create smaller tables</a:t>
             </a:r>
           </a:p>
           <a:p>
@@ -3494,19 +3482,7 @@
                 <a:cs typeface="Lucida Grande" charset="0"/>
                 <a:sym typeface="Lucida Grande" charset="0"/>
               </a:rPr>
-              <a:t>Then you can take manual actions to clean </a:t>
-            </a:r>
-            <a:r>
-              <a:rPr lang="en-US" b="0" baseline="0" dirty="0" smtClean="0">
-                <a:solidFill>
-                  <a:srgbClr val="000000"/>
-                </a:solidFill>
-                <a:latin typeface="Lucida Grande" charset="0"/>
-                <a:ea typeface="ＭＳ Ｐゴシック" charset="0"/>
-                <a:cs typeface="Lucida Grande" charset="0"/>
-                <a:sym typeface="Lucida Grande" charset="0"/>
-              </a:rPr>
-              <a:t>up</a:t>
+              <a:t>Then you can take manual actions to clean up</a:t>
             </a:r>
           </a:p>
           <a:p>
@@ -4482,7 +4458,7 @@
               <a:pPr>
                 <a:defRPr/>
               </a:pPr>
-              <a:t>11/4/11</a:t>
+              <a:t>12/7/11</a:t>
             </a:fld>
             <a:endParaRPr lang="en-US"/>
           </a:p>
@@ -4903,7 +4879,7 @@
               <a:pPr>
                 <a:defRPr/>
               </a:pPr>
-              <a:t>11/4/11</a:t>
+              <a:t>12/7/11</a:t>
             </a:fld>
             <a:endParaRPr lang="en-US"/>
           </a:p>
@@ -5628,7 +5604,7 @@
               <a:pPr>
                 <a:defRPr/>
               </a:pPr>
-              <a:t>11/4/11</a:t>
+              <a:t>12/7/11</a:t>
             </a:fld>
             <a:endParaRPr lang="en-US"/>
           </a:p>
@@ -6181,7 +6157,7 @@
               <a:pPr>
                 <a:defRPr/>
               </a:pPr>
-              <a:t>11/4/11</a:t>
+              <a:t>12/7/11</a:t>
             </a:fld>
             <a:endParaRPr lang="en-US"/>
           </a:p>
@@ -6532,7 +6508,7 @@
               <a:pPr>
                 <a:defRPr/>
               </a:pPr>
-              <a:t>11/4/11</a:t>
+              <a:t>12/7/11</a:t>
             </a:fld>
             <a:endParaRPr lang="en-US"/>
           </a:p>
@@ -6890,7 +6866,7 @@
               <a:pPr>
                 <a:defRPr/>
               </a:pPr>
-              <a:t>11/4/11</a:t>
+              <a:t>12/7/11</a:t>
             </a:fld>
             <a:endParaRPr lang="en-US"/>
           </a:p>
@@ -7125,7 +7101,7 @@
               <a:pPr>
                 <a:defRPr/>
               </a:pPr>
-              <a:t>11/4/11</a:t>
+              <a:t>12/7/11</a:t>
             </a:fld>
             <a:endParaRPr lang="en-US"/>
           </a:p>
@@ -7417,7 +7393,7 @@
               <a:pPr>
                 <a:defRPr/>
               </a:pPr>
-              <a:t>11/4/11</a:t>
+              <a:t>12/7/11</a:t>
             </a:fld>
             <a:endParaRPr lang="en-US"/>
           </a:p>
@@ -9956,21 +9932,34 @@
           <a:p>
             <a:pPr eaLnBrk="1" hangingPunct="1"/>
             <a:r>
-              <a:rPr lang="en-US" dirty="0" err="1" smtClean="0">
+              <a:rPr lang="en-US" dirty="0" smtClean="0">
                 <a:latin typeface="Trebuchet MS" charset="0"/>
                 <a:ea typeface="ヒラギノ角ゴ ProN W3" charset="0"/>
                 <a:cs typeface="ヒラギノ角ゴ ProN W3" charset="0"/>
               </a:rPr>
-              <a:t>Appc</a:t>
-            </a:r>
-            <a:r>
-              <a:rPr lang="en-US" dirty="0" smtClean="0">
+              <a:t>Lazy Loaded Tables http://</a:t>
+            </a:r>
+            <a:r>
+              <a:rPr lang="en-US" dirty="0" err="1" smtClean="0">
                 <a:latin typeface="Trebuchet MS" charset="0"/>
                 <a:ea typeface="ヒラギノ角ゴ ProN W3" charset="0"/>
                 <a:cs typeface="ヒラギノ角ゴ ProN W3" charset="0"/>
               </a:rPr>
-              <a:t> refactoring table view APIs to be more like native</a:t>
-            </a:r>
+              <a:t>j.mp</a:t>
+            </a:r>
+            <a:r>
+              <a:rPr lang="en-US" dirty="0" smtClean="0">
+                <a:latin typeface="Trebuchet MS" charset="0"/>
+                <a:ea typeface="ヒラギノ角ゴ ProN W3" charset="0"/>
+                <a:cs typeface="ヒラギノ角ゴ ProN W3" charset="0"/>
+              </a:rPr>
+              <a:t>/rbL32h</a:t>
+            </a:r>
+            <a:endParaRPr lang="en-US" dirty="0" smtClean="0">
+              <a:latin typeface="Trebuchet MS" charset="0"/>
+              <a:ea typeface="ヒラギノ角ゴ ProN W3" charset="0"/>
+              <a:cs typeface="ヒラギノ角ゴ ProN W3" charset="0"/>
+            </a:endParaRPr>
           </a:p>
           <a:p>
             <a:pPr eaLnBrk="1" hangingPunct="1"/>
@@ -13538,15 +13527,7 @@
                 <a:ea typeface="ヒラギノ角ゴ ProN W3" charset="0"/>
                 <a:cs typeface="ヒラギノ角ゴ ProN W3" charset="0"/>
               </a:rPr>
-              <a:t>“Mark and swee</a:t>
-            </a:r>
-            <a:r>
-              <a:rPr lang="en-US" dirty="0" smtClean="0">
-                <a:latin typeface="Trebuchet MS" charset="0"/>
-                <a:ea typeface="ヒラギノ角ゴ ProN W3" charset="0"/>
-                <a:cs typeface="ヒラギノ角ゴ ProN W3" charset="0"/>
-              </a:rPr>
-              <a:t>p”</a:t>
+              <a:t>“Mark and sweep”</a:t>
             </a:r>
           </a:p>
           <a:p>
@@ -13567,11 +13548,6 @@
               </a:rPr>
               <a:t>Force by removing all references</a:t>
             </a:r>
-            <a:endParaRPr lang="en-US" dirty="0" smtClean="0">
-              <a:latin typeface="Trebuchet MS" charset="0"/>
-              <a:ea typeface="ヒラギノ角ゴ ProN W3" charset="0"/>
-              <a:cs typeface="ヒラギノ角ゴ ProN W3" charset="0"/>
-            </a:endParaRPr>
           </a:p>
         </p:txBody>
       </p:sp>
@@ -14076,15 +14052,7 @@
                 <a:ea typeface="ヒラギノ角ゴ ProN W3" charset="0"/>
                 <a:cs typeface="ヒラギノ角ゴ ProN W3" charset="0"/>
               </a:rPr>
-              <a:t>Note: Showing/hiding views will improve DRAW SPEED, but memory will still be in </a:t>
-            </a:r>
-            <a:r>
-              <a:rPr lang="en-US" dirty="0" smtClean="0">
-                <a:latin typeface="Trebuchet MS" charset="0"/>
-                <a:ea typeface="ヒラギノ角ゴ ProN W3" charset="0"/>
-                <a:cs typeface="ヒラギノ角ゴ ProN W3" charset="0"/>
-              </a:rPr>
-              <a:t>use</a:t>
+              <a:t>Note: Showing/hiding views will improve DRAW SPEED, but memory will still be in use</a:t>
             </a:r>
           </a:p>
         </p:txBody>

</xml_diff>

<commit_message>
Removed remaining reference to TiBountyHunter
</commit_message>
<xml_diff>
--- a/300.pptx
+++ b/300.pptx
@@ -1832,10 +1832,10 @@
                 <a:cs typeface="Times New Roman" charset="0"/>
                 <a:sym typeface="Times New Roman" charset="0"/>
               </a:rPr>
-              <a:t>In this lab, we will be examining a refactored </a:t>
-            </a:r>
-            <a:r>
-              <a:rPr lang="en-US" dirty="0" err="1" smtClean="0">
+              <a:t>In this lab</a:t>
+            </a:r>
+            <a:r>
+              <a:rPr lang="en-US" dirty="0" smtClean="0">
                 <a:solidFill>
                   <a:srgbClr val="000000"/>
                 </a:solidFill>
@@ -1844,10 +1844,10 @@
                 <a:cs typeface="Times New Roman" charset="0"/>
                 <a:sym typeface="Times New Roman" charset="0"/>
               </a:rPr>
-              <a:t>TiBountyHunter</a:t>
-            </a:r>
-            <a:r>
-              <a:rPr lang="en-US" dirty="0" smtClean="0">
+              <a:t>, you will examine an app that contains a memory leak. You’ll apply a fix for that memory leak</a:t>
+            </a:r>
+            <a:r>
+              <a:rPr lang="en-US" baseline="0" dirty="0" smtClean="0">
                 <a:solidFill>
                   <a:srgbClr val="000000"/>
                 </a:solidFill>
@@ -1856,10 +1856,10 @@
                 <a:cs typeface="Times New Roman" charset="0"/>
                 <a:sym typeface="Times New Roman" charset="0"/>
               </a:rPr>
-              <a:t> that is a little smarter about performance.  It uses multiple contexts,</a:t>
-            </a:r>
-            <a:r>
-              <a:rPr lang="en-US" baseline="0" dirty="0" smtClean="0">
+              <a:t> and test the results. You’ll use the Instruments tool on the </a:t>
+            </a:r>
+            <a:r>
+              <a:rPr lang="en-US" baseline="0" dirty="0" err="1" smtClean="0">
                 <a:solidFill>
                   <a:srgbClr val="000000"/>
                 </a:solidFill>
@@ -1868,15 +1868,32 @@
                 <a:cs typeface="Times New Roman" charset="0"/>
                 <a:sym typeface="Times New Roman" charset="0"/>
               </a:rPr>
-              <a:t> modular code organization, and deferred script loading.</a:t>
-            </a:r>
-          </a:p>
-          <a:p>
-            <a:pPr marL="119063" eaLnBrk="1" hangingPunct="1">
-              <a:spcBef>
-                <a:spcPts val="450"/>
-              </a:spcBef>
-            </a:pPr>
+              <a:t>iOS</a:t>
+            </a:r>
+            <a:r>
+              <a:rPr lang="en-US" baseline="0" dirty="0" smtClean="0">
+                <a:solidFill>
+                  <a:srgbClr val="000000"/>
+                </a:solidFill>
+                <a:latin typeface="Times New Roman" charset="0"/>
+                <a:ea typeface="ＭＳ Ｐゴシック" charset="0"/>
+                <a:cs typeface="Times New Roman" charset="0"/>
+                <a:sym typeface="Times New Roman" charset="0"/>
+              </a:rPr>
+              <a:t> platform for this lab. While Android testing is possible, the tools are less helpful and clear in the information </a:t>
+            </a:r>
+            <a:r>
+              <a:rPr lang="en-US" baseline="0" smtClean="0">
+                <a:solidFill>
+                  <a:srgbClr val="000000"/>
+                </a:solidFill>
+                <a:latin typeface="Times New Roman" charset="0"/>
+                <a:ea typeface="ＭＳ Ｐゴシック" charset="0"/>
+                <a:cs typeface="Times New Roman" charset="0"/>
+                <a:sym typeface="Times New Roman" charset="0"/>
+              </a:rPr>
+              <a:t>they present.</a:t>
+            </a:r>
             <a:endParaRPr lang="en-US" baseline="0" dirty="0" smtClean="0">
               <a:solidFill>
                 <a:srgbClr val="000000"/>
@@ -1886,25 +1903,6 @@
               <a:cs typeface="Times New Roman" charset="0"/>
               <a:sym typeface="Times New Roman" charset="0"/>
             </a:endParaRPr>
-          </a:p>
-          <a:p>
-            <a:pPr marL="119063" eaLnBrk="1" hangingPunct="1">
-              <a:spcBef>
-                <a:spcPts val="450"/>
-              </a:spcBef>
-            </a:pPr>
-            <a:r>
-              <a:rPr lang="en-US" baseline="0" dirty="0" smtClean="0">
-                <a:solidFill>
-                  <a:srgbClr val="000000"/>
-                </a:solidFill>
-                <a:latin typeface="Times New Roman" charset="0"/>
-                <a:ea typeface="ＭＳ Ｐゴシック" charset="0"/>
-                <a:cs typeface="Times New Roman" charset="0"/>
-                <a:sym typeface="Times New Roman" charset="0"/>
-              </a:rPr>
-              <a:t>We’ll download the source, build &amp; run it, then we’ll see how to defer loading during a code walk-thru</a:t>
-            </a:r>
           </a:p>
         </p:txBody>
       </p:sp>
@@ -3949,10 +3947,10 @@
                 <a:cs typeface="Times New Roman" charset="0"/>
                 <a:sym typeface="Times New Roman" charset="0"/>
               </a:rPr>
-              <a:t>Rhino </a:t>
-            </a:r>
-            <a:r>
-              <a:rPr lang="en-US" dirty="0" smtClean="0">
+              <a:t>Rhino should be needed for only old (pre 2.2) devices, so go with V8</a:t>
+            </a:r>
+            <a:r>
+              <a:rPr lang="en-US" baseline="0" dirty="0" smtClean="0">
                 <a:solidFill>
                   <a:srgbClr val="000000"/>
                 </a:solidFill>
@@ -3961,31 +3959,7 @@
                 <a:cs typeface="Times New Roman" charset="0"/>
                 <a:sym typeface="Times New Roman" charset="0"/>
               </a:rPr>
-              <a:t>should be needed for only old (pre 2.2) devices, so go with V8</a:t>
-            </a:r>
-            <a:r>
-              <a:rPr lang="en-US" baseline="0" dirty="0" smtClean="0">
-                <a:solidFill>
-                  <a:srgbClr val="000000"/>
-                </a:solidFill>
-                <a:latin typeface="Times New Roman" charset="0"/>
-                <a:ea typeface="ＭＳ Ｐゴシック" charset="0"/>
-                <a:cs typeface="Times New Roman" charset="0"/>
-                <a:sym typeface="Times New Roman" charset="0"/>
-              </a:rPr>
-              <a:t> in most </a:t>
-            </a:r>
-            <a:r>
-              <a:rPr lang="en-US" baseline="0" dirty="0" smtClean="0">
-                <a:solidFill>
-                  <a:srgbClr val="000000"/>
-                </a:solidFill>
-                <a:latin typeface="Times New Roman" charset="0"/>
-                <a:ea typeface="ＭＳ Ｐゴシック" charset="0"/>
-                <a:cs typeface="Times New Roman" charset="0"/>
-                <a:sym typeface="Times New Roman" charset="0"/>
-              </a:rPr>
-              <a:t>cases</a:t>
+              <a:t> in most cases</a:t>
             </a:r>
           </a:p>
           <a:p>
@@ -4580,7 +4554,7 @@
               <a:pPr>
                 <a:defRPr/>
               </a:pPr>
-              <a:t>12/14/11</a:t>
+              <a:t>12/20/11</a:t>
             </a:fld>
             <a:endParaRPr lang="en-US"/>
           </a:p>
@@ -5001,7 +4975,7 @@
               <a:pPr>
                 <a:defRPr/>
               </a:pPr>
-              <a:t>12/14/11</a:t>
+              <a:t>12/20/11</a:t>
             </a:fld>
             <a:endParaRPr lang="en-US"/>
           </a:p>
@@ -5726,7 +5700,7 @@
               <a:pPr>
                 <a:defRPr/>
               </a:pPr>
-              <a:t>12/14/11</a:t>
+              <a:t>12/20/11</a:t>
             </a:fld>
             <a:endParaRPr lang="en-US"/>
           </a:p>
@@ -6279,7 +6253,7 @@
               <a:pPr>
                 <a:defRPr/>
               </a:pPr>
-              <a:t>12/14/11</a:t>
+              <a:t>12/20/11</a:t>
             </a:fld>
             <a:endParaRPr lang="en-US"/>
           </a:p>
@@ -6630,7 +6604,7 @@
               <a:pPr>
                 <a:defRPr/>
               </a:pPr>
-              <a:t>12/14/11</a:t>
+              <a:t>12/20/11</a:t>
             </a:fld>
             <a:endParaRPr lang="en-US"/>
           </a:p>
@@ -6988,7 +6962,7 @@
               <a:pPr>
                 <a:defRPr/>
               </a:pPr>
-              <a:t>12/14/11</a:t>
+              <a:t>12/20/11</a:t>
             </a:fld>
             <a:endParaRPr lang="en-US"/>
           </a:p>
@@ -7223,7 +7197,7 @@
               <a:pPr>
                 <a:defRPr/>
               </a:pPr>
-              <a:t>12/14/11</a:t>
+              <a:t>12/20/11</a:t>
             </a:fld>
             <a:endParaRPr lang="en-US"/>
           </a:p>
@@ -7515,7 +7489,7 @@
               <a:pPr>
                 <a:defRPr/>
               </a:pPr>
-              <a:t>12/14/11</a:t>
+              <a:t>12/20/11</a:t>
             </a:fld>
             <a:endParaRPr lang="en-US"/>
           </a:p>
@@ -11753,13 +11727,8 @@
             </a:pPr>
             <a:r>
               <a:rPr lang="en-US" dirty="0" smtClean="0"/>
-              <a:t>Examine refactored </a:t>
-            </a:r>
-            <a:r>
-              <a:rPr lang="en-US" dirty="0" err="1" smtClean="0"/>
-              <a:t>TiBountyHunter</a:t>
-            </a:r>
-            <a:endParaRPr lang="en-US" dirty="0" smtClean="0"/>
+              <a:t>Analyze a memory leak</a:t>
+            </a:r>
           </a:p>
           <a:p>
             <a:pPr>
@@ -11783,33 +11752,9 @@
             </a:pPr>
             <a:r>
               <a:rPr lang="en-US" dirty="0" smtClean="0"/>
-              <a:t>Improves code modularization</a:t>
-            </a:r>
-          </a:p>
-          <a:p>
-            <a:pPr>
-              <a:spcBef>
-                <a:spcPts val="600"/>
-              </a:spcBef>
-              <a:buClrTx/>
-              <a:buFontTx/>
-              <a:buNone/>
-            </a:pPr>
-            <a:endParaRPr lang="en-US" dirty="0"/>
-          </a:p>
-          <a:p>
-            <a:pPr>
-              <a:spcBef>
-                <a:spcPts val="600"/>
-              </a:spcBef>
-              <a:buClrTx/>
-              <a:buFontTx/>
-              <a:buNone/>
-            </a:pPr>
-            <a:r>
-              <a:rPr lang="en-US" dirty="0" smtClean="0"/>
-              <a:t>Defers script loading</a:t>
-            </a:r>
+              <a:t>Correct the leak and test the app</a:t>
+            </a:r>
+            <a:endParaRPr lang="en-US" dirty="0" smtClean="0"/>
           </a:p>
           <a:p>
             <a:pPr>

</xml_diff>